<commit_message>
Second pass on all the modules to clean up presentation
</commit_message>
<xml_diff>
--- a/02-code_review.pptx
+++ b/02-code_review.pptx
@@ -6,10 +6,10 @@
     <p:sldMasterId id="2147483847" r:id="rId6"/>
   </p:sldMasterIdLst>
   <p:notesMasterIdLst>
-    <p:notesMasterId r:id="rId15"/>
+    <p:notesMasterId r:id="rId17"/>
   </p:notesMasterIdLst>
   <p:handoutMasterIdLst>
-    <p:handoutMasterId r:id="rId16"/>
+    <p:handoutMasterId r:id="rId18"/>
   </p:handoutMasterIdLst>
   <p:sldIdLst>
     <p:sldId id="561" r:id="rId7"/>
@@ -19,7 +19,9 @@
     <p:sldId id="607" r:id="rId11"/>
     <p:sldId id="608" r:id="rId12"/>
     <p:sldId id="609" r:id="rId13"/>
-    <p:sldId id="376" r:id="rId14"/>
+    <p:sldId id="610" r:id="rId14"/>
+    <p:sldId id="611" r:id="rId15"/>
+    <p:sldId id="376" r:id="rId16"/>
   </p:sldIdLst>
   <p:sldSz cx="16256000" cy="9144000"/>
   <p:notesSz cx="6858000" cy="9144000"/>
@@ -150,7 +152,7 @@
   </p:defaultTextStyle>
   <p:extLst>
     <p:ext uri="{EFAFB233-063F-42B5-8137-9DF3F51BA10A}">
-      <p15:sldGuideLst xmlns="" xmlns:p15="http://schemas.microsoft.com/office/powerpoint/2012/main">
+      <p15:sldGuideLst xmlns:p15="http://schemas.microsoft.com/office/powerpoint/2012/main" xmlns="">
         <p15:guide id="1" orient="horz" pos="894">
           <p15:clr>
             <a:srgbClr val="A4A3A4"/>
@@ -164,7 +166,7 @@
       </p15:sldGuideLst>
     </p:ext>
     <p:ext uri="{2D200454-40CA-4A62-9FC3-DE9A4176ACB9}">
-      <p15:notesGuideLst xmlns="" xmlns:p15="http://schemas.microsoft.com/office/powerpoint/2012/main"/>
+      <p15:notesGuideLst xmlns:p15="http://schemas.microsoft.com/office/powerpoint/2012/main" xmlns=""/>
     </p:ext>
   </p:extLst>
 </p:presentation>
@@ -281,7 +283,7 @@
               <a:pPr>
                 <a:defRPr/>
               </a:pPr>
-              <a:t>10/24/16</a:t>
+              <a:t>10/25/16</a:t>
             </a:fld>
             <a:endParaRPr lang="en-US" dirty="0"/>
           </a:p>
@@ -464,7 +466,7 @@
               <a:pPr>
                 <a:defRPr/>
               </a:pPr>
-              <a:t>10/24/16</a:t>
+              <a:t>10/25/16</a:t>
             </a:fld>
             <a:endParaRPr lang="en-US" dirty="0"/>
           </a:p>
@@ -9284,11 +9286,6 @@
               </a:rPr>
               <a:t>as ...</a:t>
             </a:r>
-            <a:endParaRPr lang="en-US" sz="2800" dirty="0" smtClean="0">
-              <a:solidFill>
-                <a:srgbClr val="878F94"/>
-              </a:solidFill>
-            </a:endParaRPr>
           </a:p>
         </p:txBody>
       </p:sp>
@@ -9581,6 +9578,46 @@
 </p:sld>
 </file>
 
+<file path=ppt/slides/slide10.xml><?xml version="1.0" encoding="utf-8"?>
+<p:sld xmlns:a="http://schemas.openxmlformats.org/drawingml/2006/main" xmlns:r="http://schemas.openxmlformats.org/officeDocument/2006/relationships" xmlns:p="http://schemas.openxmlformats.org/presentationml/2006/main">
+  <p:cSld>
+    <p:spTree>
+      <p:nvGrpSpPr>
+        <p:cNvPr id="1" name=""/>
+        <p:cNvGrpSpPr/>
+        <p:nvPr/>
+      </p:nvGrpSpPr>
+      <p:grpSpPr>
+        <a:xfrm>
+          <a:off x="0" y="0"/>
+          <a:ext cx="0" cy="0"/>
+          <a:chOff x="0" y="0"/>
+          <a:chExt cx="0" cy="0"/>
+        </a:xfrm>
+      </p:grpSpPr>
+    </p:spTree>
+    <p:extLst>
+      <p:ext uri="{BB962C8B-B14F-4D97-AF65-F5344CB8AC3E}">
+        <p14:creationId xmlns:p14="http://schemas.microsoft.com/office/powerpoint/2010/main" val="1515488445"/>
+      </p:ext>
+    </p:extLst>
+  </p:cSld>
+  <p:clrMapOvr>
+    <a:masterClrMapping/>
+  </p:clrMapOvr>
+  <p:transition xmlns:p14="http://schemas.microsoft.com/office/powerpoint/2010/main" spd="med">
+    <p:fade/>
+  </p:transition>
+  <p:timing>
+    <p:tnLst>
+      <p:par>
+        <p:cTn xmlns:p14="http://schemas.microsoft.com/office/powerpoint/2010/main" id="1" dur="indefinite" restart="never" nodeType="tmRoot"/>
+      </p:par>
+    </p:tnLst>
+  </p:timing>
+</p:sld>
+</file>
+
 <file path=ppt/slides/slide2.xml><?xml version="1.0" encoding="utf-8"?>
 <p:sld xmlns:a="http://schemas.openxmlformats.org/drawingml/2006/main" xmlns:r="http://schemas.openxmlformats.org/officeDocument/2006/relationships" xmlns:p="http://schemas.openxmlformats.org/presentationml/2006/main">
   <p:cSld>
@@ -9650,11 +9687,6 @@
               </a:rPr>
               <a:t>Read. Evaluate. Judge.</a:t>
             </a:r>
-            <a:endParaRPr lang="en-US" sz="7200" dirty="0" smtClean="0">
-              <a:latin typeface="Apple Chancery" charset="0"/>
-              <a:ea typeface="Apple Chancery" charset="0"/>
-              <a:cs typeface="Apple Chancery" charset="0"/>
-            </a:endParaRPr>
           </a:p>
         </p:txBody>
       </p:sp>
@@ -9666,7 +9698,7 @@
         </p:nvSpPr>
         <p:spPr bwMode="auto">
           <a:xfrm>
-            <a:off x="7713134" y="1856198"/>
+            <a:off x="7865534" y="1856198"/>
             <a:ext cx="524933" cy="524933"/>
           </a:xfrm>
           <a:prstGeom prst="ellipse">
@@ -9729,7 +9761,7 @@
         </p:nvSpPr>
         <p:spPr>
           <a:xfrm rot="16200000">
-            <a:off x="7789332" y="924864"/>
+            <a:off x="7899400" y="924864"/>
             <a:ext cx="457200" cy="3369734"/>
           </a:xfrm>
           <a:prstGeom prst="rightBrace">
@@ -9775,7 +9807,7 @@
         </p:nvSpPr>
         <p:spPr>
           <a:xfrm rot="5400000">
-            <a:off x="7789332" y="4763443"/>
+            <a:off x="7899400" y="4763443"/>
             <a:ext cx="457200" cy="3369734"/>
           </a:xfrm>
           <a:prstGeom prst="rightBrace">
@@ -9821,7 +9853,7 @@
         </p:nvSpPr>
         <p:spPr bwMode="auto">
           <a:xfrm rot="10800000">
-            <a:off x="7755466" y="6677218"/>
+            <a:off x="7865534" y="6677218"/>
             <a:ext cx="524933" cy="524933"/>
           </a:xfrm>
           <a:prstGeom prst="ellipse">
@@ -10031,7 +10063,15 @@
                   <a:schemeClr val="tx1"/>
                 </a:solidFill>
               </a:rPr>
-              <a:t>Thoughts on how to make the tests clearer?</a:t>
+              <a:t>Any thoughts </a:t>
+            </a:r>
+            <a:r>
+              <a:rPr lang="en-US" dirty="0" smtClean="0">
+                <a:solidFill>
+                  <a:schemeClr val="tx1"/>
+                </a:solidFill>
+              </a:rPr>
+              <a:t>on how to make the tests clearer?</a:t>
             </a:r>
             <a:endParaRPr lang="en-US" dirty="0">
               <a:solidFill>
@@ -10765,10 +10805,65 @@
           <a:chExt cx="0" cy="0"/>
         </a:xfrm>
       </p:grpSpPr>
+      <p:sp>
+        <p:nvSpPr>
+          <p:cNvPr id="2" name="Title 1"/>
+          <p:cNvSpPr>
+            <a:spLocks noGrp="1"/>
+          </p:cNvSpPr>
+          <p:nvPr>
+            <p:ph type="ctrTitle"/>
+          </p:nvPr>
+        </p:nvSpPr>
+        <p:spPr/>
+        <p:txBody>
+          <a:bodyPr>
+            <a:normAutofit fontScale="90000"/>
+          </a:bodyPr>
+          <a:lstStyle/>
+          <a:p>
+            <a:r>
+              <a:rPr lang="en-US" dirty="0" smtClean="0"/>
+              <a:t>Sharing Feedback</a:t>
+            </a:r>
+            <a:endParaRPr lang="en-US" dirty="0"/>
+          </a:p>
+        </p:txBody>
+      </p:sp>
+      <p:sp>
+        <p:nvSpPr>
+          <p:cNvPr id="3" name="Subtitle 2"/>
+          <p:cNvSpPr>
+            <a:spLocks noGrp="1"/>
+          </p:cNvSpPr>
+          <p:nvPr>
+            <p:ph type="subTitle" idx="1"/>
+          </p:nvPr>
+        </p:nvSpPr>
+        <p:spPr/>
+        <p:txBody>
+          <a:bodyPr/>
+          <a:lstStyle/>
+          <a:p>
+            <a:r>
+              <a:rPr lang="en-US" dirty="0" smtClean="0"/>
+              <a:t>Each team will take turns sharing a single item of feedback</a:t>
+            </a:r>
+            <a:r>
+              <a:rPr lang="en-US" dirty="0"/>
+              <a:t> </a:t>
+            </a:r>
+            <a:r>
+              <a:rPr lang="en-US" dirty="0" smtClean="0"/>
+              <a:t>on the code.</a:t>
+            </a:r>
+          </a:p>
+        </p:txBody>
+      </p:sp>
     </p:spTree>
     <p:extLst>
       <p:ext uri="{BB962C8B-B14F-4D97-AF65-F5344CB8AC3E}">
-        <p14:creationId xmlns:p14="http://schemas.microsoft.com/office/powerpoint/2010/main" val="1515488445"/>
+        <p14:creationId xmlns:p14="http://schemas.microsoft.com/office/powerpoint/2010/main" val="4268182182"/>
       </p:ext>
     </p:extLst>
   </p:cSld>
@@ -10778,13 +10873,94 @@
   <p:transition xmlns:p14="http://schemas.microsoft.com/office/powerpoint/2010/main" spd="med">
     <p:fade/>
   </p:transition>
-  <p:timing>
-    <p:tnLst>
-      <p:par>
-        <p:cTn xmlns:p14="http://schemas.microsoft.com/office/powerpoint/2010/main" id="1" dur="indefinite" restart="never" nodeType="tmRoot"/>
-      </p:par>
-    </p:tnLst>
-  </p:timing>
+</p:sld>
+</file>
+
+<file path=ppt/slides/slide9.xml><?xml version="1.0" encoding="utf-8"?>
+<p:sld xmlns:a="http://schemas.openxmlformats.org/drawingml/2006/main" xmlns:r="http://schemas.openxmlformats.org/officeDocument/2006/relationships" xmlns:p="http://schemas.openxmlformats.org/presentationml/2006/main">
+  <p:cSld>
+    <p:spTree>
+      <p:nvGrpSpPr>
+        <p:cNvPr id="1" name=""/>
+        <p:cNvGrpSpPr/>
+        <p:nvPr/>
+      </p:nvGrpSpPr>
+      <p:grpSpPr>
+        <a:xfrm>
+          <a:off x="0" y="0"/>
+          <a:ext cx="0" cy="0"/>
+          <a:chOff x="0" y="0"/>
+          <a:chExt cx="0" cy="0"/>
+        </a:xfrm>
+      </p:grpSpPr>
+      <p:sp>
+        <p:nvSpPr>
+          <p:cNvPr id="2" name="Title 1"/>
+          <p:cNvSpPr>
+            <a:spLocks noGrp="1"/>
+          </p:cNvSpPr>
+          <p:nvPr>
+            <p:ph type="ctrTitle"/>
+          </p:nvPr>
+        </p:nvSpPr>
+        <p:spPr/>
+        <p:txBody>
+          <a:bodyPr>
+            <a:normAutofit fontScale="90000"/>
+          </a:bodyPr>
+          <a:lstStyle/>
+          <a:p>
+            <a:r>
+              <a:rPr lang="en-US" dirty="0" smtClean="0"/>
+              <a:t>If You Could Only Choose One</a:t>
+            </a:r>
+            <a:endParaRPr lang="en-US" dirty="0"/>
+          </a:p>
+        </p:txBody>
+      </p:sp>
+      <p:sp>
+        <p:nvSpPr>
+          <p:cNvPr id="3" name="Subtitle 2"/>
+          <p:cNvSpPr>
+            <a:spLocks noGrp="1"/>
+          </p:cNvSpPr>
+          <p:nvPr>
+            <p:ph type="subTitle" idx="1"/>
+          </p:nvPr>
+        </p:nvSpPr>
+        <p:spPr/>
+        <p:txBody>
+          <a:bodyPr/>
+          <a:lstStyle/>
+          <a:p>
+            <a:r>
+              <a:rPr lang="en-US" dirty="0" smtClean="0"/>
+              <a:t>Each team will choose a single, </a:t>
+            </a:r>
+            <a:r>
+              <a:rPr lang="en-US" smtClean="0"/>
+              <a:t>most crucial item </a:t>
+            </a:r>
+            <a:r>
+              <a:rPr lang="en-US" dirty="0" smtClean="0"/>
+              <a:t>of feedback and share it.</a:t>
+            </a:r>
+          </a:p>
+        </p:txBody>
+      </p:sp>
+    </p:spTree>
+    <p:extLst>
+      <p:ext uri="{BB962C8B-B14F-4D97-AF65-F5344CB8AC3E}">
+        <p14:creationId xmlns:p14="http://schemas.microsoft.com/office/powerpoint/2010/main" val="1652151944"/>
+      </p:ext>
+    </p:extLst>
+  </p:cSld>
+  <p:clrMapOvr>
+    <a:masterClrMapping/>
+  </p:clrMapOvr>
+  <p:transition xmlns:p14="http://schemas.microsoft.com/office/powerpoint/2010/main" spd="med">
+    <p:fade/>
+  </p:transition>
 </p:sld>
 </file>
 
@@ -11164,7 +11340,7 @@
   <a:extraClrSchemeLst/>
   <a:extLst>
     <a:ext uri="{05A4C25C-085E-4340-85A3-A5531E510DB2}">
-      <thm15:themeFamily xmlns="" xmlns:thm15="http://schemas.microsoft.com/office/thememl/2012/main" name="Chef-TemplateComps_v09-16x9-Light.potx" id="{078CEFDB-FA7A-4E36-9964-13EF367585CB}" vid="{8B87B0F3-7308-43D5-8388-E1B49EA02652}"/>
+      <thm15:themeFamily xmlns:thm15="http://schemas.microsoft.com/office/thememl/2012/main" xmlns="" name="Chef-TemplateComps_v09-16x9-Light.potx" id="{078CEFDB-FA7A-4E36-9964-13EF367585CB}" vid="{8B87B0F3-7308-43D5-8388-E1B49EA02652}"/>
     </a:ext>
   </a:extLst>
 </a:theme>
@@ -11546,7 +11722,7 @@
   <a:extraClrSchemeLst/>
   <a:extLst>
     <a:ext uri="{05A4C25C-085E-4340-85A3-A5531E510DB2}">
-      <thm15:themeFamily xmlns="" xmlns:thm15="http://schemas.microsoft.com/office/thememl/2012/main" name="Chef-TemplateComps_v09-16x9-Light.potx" id="{078CEFDB-FA7A-4E36-9964-13EF367585CB}" vid="{8B87B0F3-7308-43D5-8388-E1B49EA02652}"/>
+      <thm15:themeFamily xmlns:thm15="http://schemas.microsoft.com/office/thememl/2012/main" xmlns="" name="Chef-TemplateComps_v09-16x9-Light.potx" id="{078CEFDB-FA7A-4E36-9964-13EF367585CB}" vid="{8B87B0F3-7308-43D5-8388-E1B49EA02652}"/>
     </a:ext>
   </a:extLst>
 </a:theme>

</xml_diff>

<commit_message>
Fixes minor issues in the code review section
While in there to copy and paste some of those slides I found
and fixes some typos in the module.

Signed-off-by: Franklin Webber <franklin@chef.io>
</commit_message>
<xml_diff>
--- a/02-code_review.pptx
+++ b/02-code_review.pptx
@@ -964,11 +964,7 @@
           <a:p>
             <a:r>
               <a:rPr lang="en-US" dirty="0" smtClean="0"/>
-              <a:t>After </a:t>
-            </a:r>
-            <a:r>
-              <a:rPr lang="en-US" dirty="0" smtClean="0"/>
-              <a:t>a</a:t>
+              <a:t>After a</a:t>
             </a:r>
             <a:r>
               <a:rPr lang="en-US" baseline="0" dirty="0" smtClean="0"/>
@@ -1255,28 +1251,16 @@
             </a:r>
             <a:r>
               <a:rPr lang="en-US" baseline="0" dirty="0" smtClean="0"/>
-              <a:t> cookbook's default recipe. Within this example group we see another context that is defined. This time using the method 'context'. 'context' and 'describe' are exactly same in almost every way. A lot of developers like to use context as it more clearly states that the example group is focused on a particular scenario. In this instance the particular scenario we are going to be specifying examples in a scenario where all the attributes are default on an unspecified platform</a:t>
-            </a:r>
+              <a:t> cookbook's default recipe. Within this example group we see another context that is defined. This time using the method 'context'. 'context' and 'describe' are exactly same in almost every way. A lot of developers like to use context as it more clearly states that the example group is focused on a particular scenario. In this instance the particular scenario we are going to be specifying examples in a scenario where all the attributes are default on an unspecified platform.</a:t>
+            </a:r>
+          </a:p>
+          <a:p>
+            <a:endParaRPr lang="en-US" baseline="0" dirty="0" smtClean="0"/>
+          </a:p>
+          <a:p>
             <a:r>
               <a:rPr lang="en-US" baseline="0" dirty="0" smtClean="0"/>
-              <a:t>.</a:t>
-            </a:r>
-          </a:p>
-          <a:p>
-            <a:endParaRPr lang="en-US" baseline="0" dirty="0" smtClean="0"/>
-          </a:p>
-          <a:p>
-            <a:r>
-              <a:rPr lang="en-US" baseline="0" dirty="0" smtClean="0"/>
-              <a:t>Note</a:t>
-            </a:r>
-            <a:r>
-              <a:rPr lang="en-US" baseline="0" dirty="0" smtClean="0"/>
-              <a:t>: 'describe' and 'context' are almost completely interchangeable with one exception. 'context' cannot be used as the outermost example group</a:t>
-            </a:r>
-            <a:r>
-              <a:rPr lang="en-US" baseline="0" dirty="0" smtClean="0"/>
-              <a:t>. 'context' is often used to help articulate</a:t>
+              <a:t>Note: 'describe' and 'context' are almost completely interchangeable with one exception. 'context' cannot be used as the outermost example group. 'context' is often used to help articulate</a:t>
             </a:r>
             <a:r>
               <a:rPr lang="en-US" dirty="0" smtClean="0"/>
@@ -1605,11 +1589,7 @@
           <a:p>
             <a:r>
               <a:rPr lang="en-US" baseline="0" dirty="0" smtClean="0"/>
-              <a:t>Within the inner context we finally set the stage for us to define our examples with their </a:t>
-            </a:r>
-            <a:r>
-              <a:rPr lang="en-US" baseline="0" dirty="0" smtClean="0"/>
-              <a:t>expectations.</a:t>
+              <a:t>Within the inner context we finally set the stage for us to define our examples with their expectations.</a:t>
             </a:r>
           </a:p>
           <a:p>
@@ -2335,11 +2315,7 @@
           <a:p>
             <a:r>
               <a:rPr lang="en-US" dirty="0" smtClean="0"/>
-              <a:t>For this exercise I want you to form a grou</a:t>
-            </a:r>
-            <a:r>
-              <a:rPr lang="en-US" dirty="0" smtClean="0"/>
-              <a:t>p, review the code for clarity and purpose, and then create a list of items which the group feels like would help improve the clarity of this code.</a:t>
+              <a:t>For this exercise I want you to form a group, review the code for clarity and purpose, and then create a list of items which the group feels like would help improve the clarity of this code.</a:t>
             </a:r>
             <a:endParaRPr lang="en-US" dirty="0"/>
           </a:p>
@@ -2691,7 +2667,11 @@
           <a:bodyPr/>
           <a:lstStyle/>
           <a:p>
-            <a:endParaRPr lang="en-US"/>
+            <a:r>
+              <a:rPr lang="en-US" dirty="0" smtClean="0"/>
+              <a:t>As a group you may have found several different issues. As a group what would you choose if you had to select one thing to address.</a:t>
+            </a:r>
+            <a:endParaRPr lang="en-US" dirty="0"/>
           </a:p>
         </p:txBody>
       </p:sp>
@@ -3550,11 +3530,7 @@
             </a:r>
             <a:r>
               <a:rPr lang="en-US" baseline="0" dirty="0" smtClean="0"/>
-              <a:t>builds the </a:t>
-            </a:r>
-            <a:r>
-              <a:rPr lang="en-US" baseline="0" dirty="0" smtClean="0"/>
-              <a:t>resource collection, and then setting up expectations about the state of the resource collection. </a:t>
+              <a:t>builds the resource collection, and then setting up expectations about the state of the resource collection. </a:t>
             </a:r>
             <a:r>
               <a:rPr lang="en-US" baseline="0" dirty="0" err="1" smtClean="0"/>
@@ -3578,11 +3554,7 @@
             </a:r>
             <a:r>
               <a:rPr lang="en-US" baseline="0" dirty="0" smtClean="0"/>
-              <a:t>, is </a:t>
-            </a:r>
-            <a:r>
-              <a:rPr lang="en-US" baseline="0" dirty="0" smtClean="0"/>
-              <a:t>built on top of RSpec; relying on it to provide the core framework and language. The benefit to us is that a lot of the same language constructs are employed.</a:t>
+              <a:t>, is built on top of RSpec; relying on it to provide the core framework and language. The benefit to us is that a lot of the same language constructs are employed.</a:t>
             </a:r>
           </a:p>
         </p:txBody>
@@ -4637,14 +4609,14 @@
           </a:ln>
           <a:extLst>
             <a:ext uri="{909E8E84-426E-40dd-AFC4-6F175D3DCCD1}">
-              <a14:hiddenFill xmlns:a14="http://schemas.microsoft.com/office/drawing/2010/main" xmlns="">
+              <a14:hiddenFill xmlns="" xmlns:a14="http://schemas.microsoft.com/office/drawing/2010/main">
                 <a:solidFill>
                   <a:srgbClr val="FFFFFF"/>
                 </a:solidFill>
               </a14:hiddenFill>
             </a:ext>
             <a:ext uri="{91240B29-F687-4f45-9708-019B960494DF}">
-              <a14:hiddenLine xmlns:a14="http://schemas.microsoft.com/office/drawing/2010/main" xmlns="" w="9525">
+              <a14:hiddenLine xmlns="" xmlns:a14="http://schemas.microsoft.com/office/drawing/2010/main" w="9525">
                 <a:solidFill>
                   <a:srgbClr val="000000"/>
                 </a:solidFill>
@@ -4792,14 +4764,14 @@
           </a:ln>
           <a:extLst>
             <a:ext uri="{909E8E84-426E-40dd-AFC4-6F175D3DCCD1}">
-              <a14:hiddenFill xmlns:a14="http://schemas.microsoft.com/office/drawing/2010/main" xmlns="">
+              <a14:hiddenFill xmlns="" xmlns:a14="http://schemas.microsoft.com/office/drawing/2010/main">
                 <a:solidFill>
                   <a:srgbClr val="FFFFFF"/>
                 </a:solidFill>
               </a14:hiddenFill>
             </a:ext>
             <a:ext uri="{91240B29-F687-4f45-9708-019B960494DF}">
-              <a14:hiddenLine xmlns:a14="http://schemas.microsoft.com/office/drawing/2010/main" xmlns="" w="9525">
+              <a14:hiddenLine xmlns="" xmlns:a14="http://schemas.microsoft.com/office/drawing/2010/main" w="9525">
                 <a:solidFill>
                   <a:srgbClr val="000000"/>
                 </a:solidFill>
@@ -5290,14 +5262,14 @@
           </a:ln>
           <a:extLst>
             <a:ext uri="{909E8E84-426E-40dd-AFC4-6F175D3DCCD1}">
-              <a14:hiddenFill xmlns:a14="http://schemas.microsoft.com/office/drawing/2010/main" xmlns="">
+              <a14:hiddenFill xmlns="" xmlns:a14="http://schemas.microsoft.com/office/drawing/2010/main">
                 <a:solidFill>
                   <a:srgbClr val="FFFFFF"/>
                 </a:solidFill>
               </a14:hiddenFill>
             </a:ext>
             <a:ext uri="{91240B29-F687-4f45-9708-019B960494DF}">
-              <a14:hiddenLine xmlns:a14="http://schemas.microsoft.com/office/drawing/2010/main" xmlns="" w="9525">
+              <a14:hiddenLine xmlns="" xmlns:a14="http://schemas.microsoft.com/office/drawing/2010/main" w="9525">
                 <a:solidFill>
                   <a:srgbClr val="000000"/>
                 </a:solidFill>
@@ -6763,14 +6735,14 @@
           </a:ln>
           <a:extLst>
             <a:ext uri="{909E8E84-426E-40dd-AFC4-6F175D3DCCD1}">
-              <a14:hiddenFill xmlns:a14="http://schemas.microsoft.com/office/drawing/2010/main" xmlns="">
+              <a14:hiddenFill xmlns="" xmlns:a14="http://schemas.microsoft.com/office/drawing/2010/main">
                 <a:solidFill>
                   <a:srgbClr val="FFFFFF"/>
                 </a:solidFill>
               </a14:hiddenFill>
             </a:ext>
             <a:ext uri="{91240B29-F687-4f45-9708-019B960494DF}">
-              <a14:hiddenLine xmlns:a14="http://schemas.microsoft.com/office/drawing/2010/main" xmlns="" w="9525">
+              <a14:hiddenLine xmlns="" xmlns:a14="http://schemas.microsoft.com/office/drawing/2010/main" w="9525">
                 <a:solidFill>
                   <a:srgbClr val="000000"/>
                 </a:solidFill>
@@ -8213,14 +8185,14 @@
           </a:ln>
           <a:extLst>
             <a:ext uri="{909E8E84-426E-40dd-AFC4-6F175D3DCCD1}">
-              <a14:hiddenFill xmlns:a14="http://schemas.microsoft.com/office/drawing/2010/main" xmlns="">
+              <a14:hiddenFill xmlns="" xmlns:a14="http://schemas.microsoft.com/office/drawing/2010/main">
                 <a:solidFill>
                   <a:srgbClr val="FFFFFF"/>
                 </a:solidFill>
               </a14:hiddenFill>
             </a:ext>
             <a:ext uri="{91240B29-F687-4f45-9708-019B960494DF}">
-              <a14:hiddenLine xmlns:a14="http://schemas.microsoft.com/office/drawing/2010/main" xmlns="" w="9525">
+              <a14:hiddenLine xmlns="" xmlns:a14="http://schemas.microsoft.com/office/drawing/2010/main" w="9525">
                 <a:solidFill>
                   <a:srgbClr val="000000"/>
                 </a:solidFill>
@@ -8753,14 +8725,14 @@
           </a:ln>
           <a:extLst>
             <a:ext uri="{909E8E84-426E-40dd-AFC4-6F175D3DCCD1}">
-              <a14:hiddenFill xmlns:a14="http://schemas.microsoft.com/office/drawing/2010/main" xmlns="">
+              <a14:hiddenFill xmlns="" xmlns:a14="http://schemas.microsoft.com/office/drawing/2010/main">
                 <a:solidFill>
                   <a:srgbClr val="FFFFFF"/>
                 </a:solidFill>
               </a14:hiddenFill>
             </a:ext>
             <a:ext uri="{91240B29-F687-4f45-9708-019B960494DF}">
-              <a14:hiddenLine xmlns:a14="http://schemas.microsoft.com/office/drawing/2010/main" xmlns="" w="9525">
+              <a14:hiddenLine xmlns="" xmlns:a14="http://schemas.microsoft.com/office/drawing/2010/main" w="9525">
                 <a:solidFill>
                   <a:srgbClr val="000000"/>
                 </a:solidFill>
@@ -9318,14 +9290,14 @@
           </a:ln>
           <a:extLst>
             <a:ext uri="{909E8E84-426E-40dd-AFC4-6F175D3DCCD1}">
-              <a14:hiddenFill xmlns:a14="http://schemas.microsoft.com/office/drawing/2010/main" xmlns="">
+              <a14:hiddenFill xmlns="" xmlns:a14="http://schemas.microsoft.com/office/drawing/2010/main">
                 <a:solidFill>
                   <a:srgbClr val="FFFFFF"/>
                 </a:solidFill>
               </a14:hiddenFill>
             </a:ext>
             <a:ext uri="{91240B29-F687-4f45-9708-019B960494DF}">
-              <a14:hiddenLine xmlns:a14="http://schemas.microsoft.com/office/drawing/2010/main" xmlns="" w="9525">
+              <a14:hiddenLine xmlns="" xmlns:a14="http://schemas.microsoft.com/office/drawing/2010/main" w="9525">
                 <a:solidFill>
                   <a:srgbClr val="000000"/>
                 </a:solidFill>
@@ -9892,14 +9864,14 @@
           </a:ln>
           <a:extLst>
             <a:ext uri="{909E8E84-426E-40dd-AFC4-6F175D3DCCD1}">
-              <a14:hiddenFill xmlns:a14="http://schemas.microsoft.com/office/drawing/2010/main" xmlns="">
+              <a14:hiddenFill xmlns="" xmlns:a14="http://schemas.microsoft.com/office/drawing/2010/main">
                 <a:solidFill>
                   <a:srgbClr val="FFFFFF"/>
                 </a:solidFill>
               </a14:hiddenFill>
             </a:ext>
             <a:ext uri="{91240B29-F687-4f45-9708-019B960494DF}">
-              <a14:hiddenLine xmlns:a14="http://schemas.microsoft.com/office/drawing/2010/main" xmlns="" w="9525">
+              <a14:hiddenLine xmlns="" xmlns:a14="http://schemas.microsoft.com/office/drawing/2010/main" w="9525">
                 <a:solidFill>
                   <a:srgbClr val="000000"/>
                 </a:solidFill>
@@ -10551,14 +10523,14 @@
           </a:ln>
           <a:extLst>
             <a:ext uri="{909E8E84-426E-40dd-AFC4-6F175D3DCCD1}">
-              <a14:hiddenFill xmlns:a14="http://schemas.microsoft.com/office/drawing/2010/main" xmlns="">
+              <a14:hiddenFill xmlns="" xmlns:a14="http://schemas.microsoft.com/office/drawing/2010/main">
                 <a:solidFill>
                   <a:srgbClr val="FFFFFF"/>
                 </a:solidFill>
               </a14:hiddenFill>
             </a:ext>
             <a:ext uri="{91240B29-F687-4f45-9708-019B960494DF}">
-              <a14:hiddenLine xmlns:a14="http://schemas.microsoft.com/office/drawing/2010/main" xmlns="" w="9525">
+              <a14:hiddenLine xmlns="" xmlns:a14="http://schemas.microsoft.com/office/drawing/2010/main" w="9525">
                 <a:solidFill>
                   <a:srgbClr val="000000"/>
                 </a:solidFill>
@@ -11332,14 +11304,14 @@
           </a:ln>
           <a:extLst>
             <a:ext uri="{909E8E84-426E-40dd-AFC4-6F175D3DCCD1}">
-              <a14:hiddenFill xmlns:a14="http://schemas.microsoft.com/office/drawing/2010/main" xmlns="">
+              <a14:hiddenFill xmlns="" xmlns:a14="http://schemas.microsoft.com/office/drawing/2010/main">
                 <a:solidFill>
                   <a:srgbClr val="FFFFFF"/>
                 </a:solidFill>
               </a14:hiddenFill>
             </a:ext>
             <a:ext uri="{91240B29-F687-4f45-9708-019B960494DF}">
-              <a14:hiddenLine xmlns:a14="http://schemas.microsoft.com/office/drawing/2010/main" xmlns="" w="9525">
+              <a14:hiddenLine xmlns="" xmlns:a14="http://schemas.microsoft.com/office/drawing/2010/main" w="9525">
                 <a:solidFill>
                   <a:srgbClr val="000000"/>
                 </a:solidFill>
@@ -12203,14 +12175,14 @@
           </a:ln>
           <a:extLst>
             <a:ext uri="{909E8E84-426E-40dd-AFC4-6F175D3DCCD1}">
-              <a14:hiddenFill xmlns:a14="http://schemas.microsoft.com/office/drawing/2010/main" xmlns="">
+              <a14:hiddenFill xmlns="" xmlns:a14="http://schemas.microsoft.com/office/drawing/2010/main">
                 <a:solidFill>
                   <a:srgbClr val="FFFFFF"/>
                 </a:solidFill>
               </a14:hiddenFill>
             </a:ext>
             <a:ext uri="{91240B29-F687-4f45-9708-019B960494DF}">
-              <a14:hiddenLine xmlns:a14="http://schemas.microsoft.com/office/drawing/2010/main" xmlns="" w="9525">
+              <a14:hiddenLine xmlns="" xmlns:a14="http://schemas.microsoft.com/office/drawing/2010/main" w="9525">
                 <a:solidFill>
                   <a:srgbClr val="000000"/>
                 </a:solidFill>

</xml_diff>

<commit_message>
Fixes typos in code review section
I am using this section as a template for other sections
and in the process I found more typos.

Signed-off-by: Franklin Webber <franklin@chef.io>
</commit_message>
<xml_diff>
--- a/02-code_review.pptx
+++ b/02-code_review.pptx
@@ -4609,14 +4609,14 @@
           </a:ln>
           <a:extLst>
             <a:ext uri="{909E8E84-426E-40dd-AFC4-6F175D3DCCD1}">
-              <a14:hiddenFill xmlns="" xmlns:a14="http://schemas.microsoft.com/office/drawing/2010/main">
+              <a14:hiddenFill xmlns:a14="http://schemas.microsoft.com/office/drawing/2010/main" xmlns="">
                 <a:solidFill>
                   <a:srgbClr val="FFFFFF"/>
                 </a:solidFill>
               </a14:hiddenFill>
             </a:ext>
             <a:ext uri="{91240B29-F687-4f45-9708-019B960494DF}">
-              <a14:hiddenLine xmlns="" xmlns:a14="http://schemas.microsoft.com/office/drawing/2010/main" w="9525">
+              <a14:hiddenLine xmlns:a14="http://schemas.microsoft.com/office/drawing/2010/main" xmlns="" w="9525">
                 <a:solidFill>
                   <a:srgbClr val="000000"/>
                 </a:solidFill>
@@ -4764,14 +4764,14 @@
           </a:ln>
           <a:extLst>
             <a:ext uri="{909E8E84-426E-40dd-AFC4-6F175D3DCCD1}">
-              <a14:hiddenFill xmlns="" xmlns:a14="http://schemas.microsoft.com/office/drawing/2010/main">
+              <a14:hiddenFill xmlns:a14="http://schemas.microsoft.com/office/drawing/2010/main" xmlns="">
                 <a:solidFill>
                   <a:srgbClr val="FFFFFF"/>
                 </a:solidFill>
               </a14:hiddenFill>
             </a:ext>
             <a:ext uri="{91240B29-F687-4f45-9708-019B960494DF}">
-              <a14:hiddenLine xmlns="" xmlns:a14="http://schemas.microsoft.com/office/drawing/2010/main" w="9525">
+              <a14:hiddenLine xmlns:a14="http://schemas.microsoft.com/office/drawing/2010/main" xmlns="" w="9525">
                 <a:solidFill>
                   <a:srgbClr val="000000"/>
                 </a:solidFill>
@@ -5262,14 +5262,14 @@
           </a:ln>
           <a:extLst>
             <a:ext uri="{909E8E84-426E-40dd-AFC4-6F175D3DCCD1}">
-              <a14:hiddenFill xmlns="" xmlns:a14="http://schemas.microsoft.com/office/drawing/2010/main">
+              <a14:hiddenFill xmlns:a14="http://schemas.microsoft.com/office/drawing/2010/main" xmlns="">
                 <a:solidFill>
                   <a:srgbClr val="FFFFFF"/>
                 </a:solidFill>
               </a14:hiddenFill>
             </a:ext>
             <a:ext uri="{91240B29-F687-4f45-9708-019B960494DF}">
-              <a14:hiddenLine xmlns="" xmlns:a14="http://schemas.microsoft.com/office/drawing/2010/main" w="9525">
+              <a14:hiddenLine xmlns:a14="http://schemas.microsoft.com/office/drawing/2010/main" xmlns="" w="9525">
                 <a:solidFill>
                   <a:srgbClr val="000000"/>
                 </a:solidFill>
@@ -6735,14 +6735,14 @@
           </a:ln>
           <a:extLst>
             <a:ext uri="{909E8E84-426E-40dd-AFC4-6F175D3DCCD1}">
-              <a14:hiddenFill xmlns="" xmlns:a14="http://schemas.microsoft.com/office/drawing/2010/main">
+              <a14:hiddenFill xmlns:a14="http://schemas.microsoft.com/office/drawing/2010/main" xmlns="">
                 <a:solidFill>
                   <a:srgbClr val="FFFFFF"/>
                 </a:solidFill>
               </a14:hiddenFill>
             </a:ext>
             <a:ext uri="{91240B29-F687-4f45-9708-019B960494DF}">
-              <a14:hiddenLine xmlns="" xmlns:a14="http://schemas.microsoft.com/office/drawing/2010/main" w="9525">
+              <a14:hiddenLine xmlns:a14="http://schemas.microsoft.com/office/drawing/2010/main" xmlns="" w="9525">
                 <a:solidFill>
                   <a:srgbClr val="000000"/>
                 </a:solidFill>
@@ -8185,14 +8185,14 @@
           </a:ln>
           <a:extLst>
             <a:ext uri="{909E8E84-426E-40dd-AFC4-6F175D3DCCD1}">
-              <a14:hiddenFill xmlns="" xmlns:a14="http://schemas.microsoft.com/office/drawing/2010/main">
+              <a14:hiddenFill xmlns:a14="http://schemas.microsoft.com/office/drawing/2010/main" xmlns="">
                 <a:solidFill>
                   <a:srgbClr val="FFFFFF"/>
                 </a:solidFill>
               </a14:hiddenFill>
             </a:ext>
             <a:ext uri="{91240B29-F687-4f45-9708-019B960494DF}">
-              <a14:hiddenLine xmlns="" xmlns:a14="http://schemas.microsoft.com/office/drawing/2010/main" w="9525">
+              <a14:hiddenLine xmlns:a14="http://schemas.microsoft.com/office/drawing/2010/main" xmlns="" w="9525">
                 <a:solidFill>
                   <a:srgbClr val="000000"/>
                 </a:solidFill>
@@ -8725,14 +8725,14 @@
           </a:ln>
           <a:extLst>
             <a:ext uri="{909E8E84-426E-40dd-AFC4-6F175D3DCCD1}">
-              <a14:hiddenFill xmlns="" xmlns:a14="http://schemas.microsoft.com/office/drawing/2010/main">
+              <a14:hiddenFill xmlns:a14="http://schemas.microsoft.com/office/drawing/2010/main" xmlns="">
                 <a:solidFill>
                   <a:srgbClr val="FFFFFF"/>
                 </a:solidFill>
               </a14:hiddenFill>
             </a:ext>
             <a:ext uri="{91240B29-F687-4f45-9708-019B960494DF}">
-              <a14:hiddenLine xmlns="" xmlns:a14="http://schemas.microsoft.com/office/drawing/2010/main" w="9525">
+              <a14:hiddenLine xmlns:a14="http://schemas.microsoft.com/office/drawing/2010/main" xmlns="" w="9525">
                 <a:solidFill>
                   <a:srgbClr val="000000"/>
                 </a:solidFill>
@@ -9290,14 +9290,14 @@
           </a:ln>
           <a:extLst>
             <a:ext uri="{909E8E84-426E-40dd-AFC4-6F175D3DCCD1}">
-              <a14:hiddenFill xmlns="" xmlns:a14="http://schemas.microsoft.com/office/drawing/2010/main">
+              <a14:hiddenFill xmlns:a14="http://schemas.microsoft.com/office/drawing/2010/main" xmlns="">
                 <a:solidFill>
                   <a:srgbClr val="FFFFFF"/>
                 </a:solidFill>
               </a14:hiddenFill>
             </a:ext>
             <a:ext uri="{91240B29-F687-4f45-9708-019B960494DF}">
-              <a14:hiddenLine xmlns="" xmlns:a14="http://schemas.microsoft.com/office/drawing/2010/main" w="9525">
+              <a14:hiddenLine xmlns:a14="http://schemas.microsoft.com/office/drawing/2010/main" xmlns="" w="9525">
                 <a:solidFill>
                   <a:srgbClr val="000000"/>
                 </a:solidFill>
@@ -9864,14 +9864,14 @@
           </a:ln>
           <a:extLst>
             <a:ext uri="{909E8E84-426E-40dd-AFC4-6F175D3DCCD1}">
-              <a14:hiddenFill xmlns="" xmlns:a14="http://schemas.microsoft.com/office/drawing/2010/main">
+              <a14:hiddenFill xmlns:a14="http://schemas.microsoft.com/office/drawing/2010/main" xmlns="">
                 <a:solidFill>
                   <a:srgbClr val="FFFFFF"/>
                 </a:solidFill>
               </a14:hiddenFill>
             </a:ext>
             <a:ext uri="{91240B29-F687-4f45-9708-019B960494DF}">
-              <a14:hiddenLine xmlns="" xmlns:a14="http://schemas.microsoft.com/office/drawing/2010/main" w="9525">
+              <a14:hiddenLine xmlns:a14="http://schemas.microsoft.com/office/drawing/2010/main" xmlns="" w="9525">
                 <a:solidFill>
                   <a:srgbClr val="000000"/>
                 </a:solidFill>
@@ -10523,14 +10523,14 @@
           </a:ln>
           <a:extLst>
             <a:ext uri="{909E8E84-426E-40dd-AFC4-6F175D3DCCD1}">
-              <a14:hiddenFill xmlns="" xmlns:a14="http://schemas.microsoft.com/office/drawing/2010/main">
+              <a14:hiddenFill xmlns:a14="http://schemas.microsoft.com/office/drawing/2010/main" xmlns="">
                 <a:solidFill>
                   <a:srgbClr val="FFFFFF"/>
                 </a:solidFill>
               </a14:hiddenFill>
             </a:ext>
             <a:ext uri="{91240B29-F687-4f45-9708-019B960494DF}">
-              <a14:hiddenLine xmlns="" xmlns:a14="http://schemas.microsoft.com/office/drawing/2010/main" w="9525">
+              <a14:hiddenLine xmlns:a14="http://schemas.microsoft.com/office/drawing/2010/main" xmlns="" w="9525">
                 <a:solidFill>
                   <a:srgbClr val="000000"/>
                 </a:solidFill>
@@ -11304,14 +11304,14 @@
           </a:ln>
           <a:extLst>
             <a:ext uri="{909E8E84-426E-40dd-AFC4-6F175D3DCCD1}">
-              <a14:hiddenFill xmlns="" xmlns:a14="http://schemas.microsoft.com/office/drawing/2010/main">
+              <a14:hiddenFill xmlns:a14="http://schemas.microsoft.com/office/drawing/2010/main" xmlns="">
                 <a:solidFill>
                   <a:srgbClr val="FFFFFF"/>
                 </a:solidFill>
               </a14:hiddenFill>
             </a:ext>
             <a:ext uri="{91240B29-F687-4f45-9708-019B960494DF}">
-              <a14:hiddenLine xmlns="" xmlns:a14="http://schemas.microsoft.com/office/drawing/2010/main" w="9525">
+              <a14:hiddenLine xmlns:a14="http://schemas.microsoft.com/office/drawing/2010/main" xmlns="" w="9525">
                 <a:solidFill>
                   <a:srgbClr val="000000"/>
                 </a:solidFill>
@@ -12175,14 +12175,14 @@
           </a:ln>
           <a:extLst>
             <a:ext uri="{909E8E84-426E-40dd-AFC4-6F175D3DCCD1}">
-              <a14:hiddenFill xmlns="" xmlns:a14="http://schemas.microsoft.com/office/drawing/2010/main">
+              <a14:hiddenFill xmlns:a14="http://schemas.microsoft.com/office/drawing/2010/main" xmlns="">
                 <a:solidFill>
                   <a:srgbClr val="FFFFFF"/>
                 </a:solidFill>
               </a14:hiddenFill>
             </a:ext>
             <a:ext uri="{91240B29-F687-4f45-9708-019B960494DF}">
-              <a14:hiddenLine xmlns="" xmlns:a14="http://schemas.microsoft.com/office/drawing/2010/main" w="9525">
+              <a14:hiddenLine xmlns:a14="http://schemas.microsoft.com/office/drawing/2010/main" xmlns="" w="9525">
                 <a:solidFill>
                   <a:srgbClr val="000000"/>
                 </a:solidFill>

</xml_diff>

<commit_message>
Update footer to 2017 and module number
Some of the module numbers were off. It's also a new year.

Signed-off-by: Franklin Webber <franklin@chef.io>
</commit_message>
<xml_diff>
--- a/02-code_review.pptx
+++ b/02-code_review.pptx
@@ -4609,14 +4609,14 @@
           </a:ln>
           <a:extLst>
             <a:ext uri="{909E8E84-426E-40dd-AFC4-6F175D3DCCD1}">
-              <a14:hiddenFill xmlns:a14="http://schemas.microsoft.com/office/drawing/2010/main" xmlns="">
+              <a14:hiddenFill xmlns="" xmlns:a14="http://schemas.microsoft.com/office/drawing/2010/main">
                 <a:solidFill>
                   <a:srgbClr val="FFFFFF"/>
                 </a:solidFill>
               </a14:hiddenFill>
             </a:ext>
             <a:ext uri="{91240B29-F687-4f45-9708-019B960494DF}">
-              <a14:hiddenLine xmlns:a14="http://schemas.microsoft.com/office/drawing/2010/main" xmlns="" w="9525">
+              <a14:hiddenLine xmlns="" xmlns:a14="http://schemas.microsoft.com/office/drawing/2010/main" w="9525">
                 <a:solidFill>
                   <a:srgbClr val="000000"/>
                 </a:solidFill>
@@ -4764,14 +4764,14 @@
           </a:ln>
           <a:extLst>
             <a:ext uri="{909E8E84-426E-40dd-AFC4-6F175D3DCCD1}">
-              <a14:hiddenFill xmlns:a14="http://schemas.microsoft.com/office/drawing/2010/main" xmlns="">
+              <a14:hiddenFill xmlns="" xmlns:a14="http://schemas.microsoft.com/office/drawing/2010/main">
                 <a:solidFill>
                   <a:srgbClr val="FFFFFF"/>
                 </a:solidFill>
               </a14:hiddenFill>
             </a:ext>
             <a:ext uri="{91240B29-F687-4f45-9708-019B960494DF}">
-              <a14:hiddenLine xmlns:a14="http://schemas.microsoft.com/office/drawing/2010/main" xmlns="" w="9525">
+              <a14:hiddenLine xmlns="" xmlns:a14="http://schemas.microsoft.com/office/drawing/2010/main" w="9525">
                 <a:solidFill>
                   <a:srgbClr val="000000"/>
                 </a:solidFill>
@@ -5262,14 +5262,14 @@
           </a:ln>
           <a:extLst>
             <a:ext uri="{909E8E84-426E-40dd-AFC4-6F175D3DCCD1}">
-              <a14:hiddenFill xmlns:a14="http://schemas.microsoft.com/office/drawing/2010/main" xmlns="">
+              <a14:hiddenFill xmlns="" xmlns:a14="http://schemas.microsoft.com/office/drawing/2010/main">
                 <a:solidFill>
                   <a:srgbClr val="FFFFFF"/>
                 </a:solidFill>
               </a14:hiddenFill>
             </a:ext>
             <a:ext uri="{91240B29-F687-4f45-9708-019B960494DF}">
-              <a14:hiddenLine xmlns:a14="http://schemas.microsoft.com/office/drawing/2010/main" xmlns="" w="9525">
+              <a14:hiddenLine xmlns="" xmlns:a14="http://schemas.microsoft.com/office/drawing/2010/main" w="9525">
                 <a:solidFill>
                   <a:srgbClr val="000000"/>
                 </a:solidFill>
@@ -6735,14 +6735,14 @@
           </a:ln>
           <a:extLst>
             <a:ext uri="{909E8E84-426E-40dd-AFC4-6F175D3DCCD1}">
-              <a14:hiddenFill xmlns:a14="http://schemas.microsoft.com/office/drawing/2010/main" xmlns="">
+              <a14:hiddenFill xmlns="" xmlns:a14="http://schemas.microsoft.com/office/drawing/2010/main">
                 <a:solidFill>
                   <a:srgbClr val="FFFFFF"/>
                 </a:solidFill>
               </a14:hiddenFill>
             </a:ext>
             <a:ext uri="{91240B29-F687-4f45-9708-019B960494DF}">
-              <a14:hiddenLine xmlns:a14="http://schemas.microsoft.com/office/drawing/2010/main" xmlns="" w="9525">
+              <a14:hiddenLine xmlns="" xmlns:a14="http://schemas.microsoft.com/office/drawing/2010/main" w="9525">
                 <a:solidFill>
                   <a:srgbClr val="000000"/>
                 </a:solidFill>
@@ -8185,14 +8185,14 @@
           </a:ln>
           <a:extLst>
             <a:ext uri="{909E8E84-426E-40dd-AFC4-6F175D3DCCD1}">
-              <a14:hiddenFill xmlns:a14="http://schemas.microsoft.com/office/drawing/2010/main" xmlns="">
+              <a14:hiddenFill xmlns="" xmlns:a14="http://schemas.microsoft.com/office/drawing/2010/main">
                 <a:solidFill>
                   <a:srgbClr val="FFFFFF"/>
                 </a:solidFill>
               </a14:hiddenFill>
             </a:ext>
             <a:ext uri="{91240B29-F687-4f45-9708-019B960494DF}">
-              <a14:hiddenLine xmlns:a14="http://schemas.microsoft.com/office/drawing/2010/main" xmlns="" w="9525">
+              <a14:hiddenLine xmlns="" xmlns:a14="http://schemas.microsoft.com/office/drawing/2010/main" w="9525">
                 <a:solidFill>
                   <a:srgbClr val="000000"/>
                 </a:solidFill>
@@ -8725,14 +8725,14 @@
           </a:ln>
           <a:extLst>
             <a:ext uri="{909E8E84-426E-40dd-AFC4-6F175D3DCCD1}">
-              <a14:hiddenFill xmlns:a14="http://schemas.microsoft.com/office/drawing/2010/main" xmlns="">
+              <a14:hiddenFill xmlns="" xmlns:a14="http://schemas.microsoft.com/office/drawing/2010/main">
                 <a:solidFill>
                   <a:srgbClr val="FFFFFF"/>
                 </a:solidFill>
               </a14:hiddenFill>
             </a:ext>
             <a:ext uri="{91240B29-F687-4f45-9708-019B960494DF}">
-              <a14:hiddenLine xmlns:a14="http://schemas.microsoft.com/office/drawing/2010/main" xmlns="" w="9525">
+              <a14:hiddenLine xmlns="" xmlns:a14="http://schemas.microsoft.com/office/drawing/2010/main" w="9525">
                 <a:solidFill>
                   <a:srgbClr val="000000"/>
                 </a:solidFill>
@@ -9290,14 +9290,14 @@
           </a:ln>
           <a:extLst>
             <a:ext uri="{909E8E84-426E-40dd-AFC4-6F175D3DCCD1}">
-              <a14:hiddenFill xmlns:a14="http://schemas.microsoft.com/office/drawing/2010/main" xmlns="">
+              <a14:hiddenFill xmlns="" xmlns:a14="http://schemas.microsoft.com/office/drawing/2010/main">
                 <a:solidFill>
                   <a:srgbClr val="FFFFFF"/>
                 </a:solidFill>
               </a14:hiddenFill>
             </a:ext>
             <a:ext uri="{91240B29-F687-4f45-9708-019B960494DF}">
-              <a14:hiddenLine xmlns:a14="http://schemas.microsoft.com/office/drawing/2010/main" xmlns="" w="9525">
+              <a14:hiddenLine xmlns="" xmlns:a14="http://schemas.microsoft.com/office/drawing/2010/main" w="9525">
                 <a:solidFill>
                   <a:srgbClr val="000000"/>
                 </a:solidFill>
@@ -9864,14 +9864,14 @@
           </a:ln>
           <a:extLst>
             <a:ext uri="{909E8E84-426E-40dd-AFC4-6F175D3DCCD1}">
-              <a14:hiddenFill xmlns:a14="http://schemas.microsoft.com/office/drawing/2010/main" xmlns="">
+              <a14:hiddenFill xmlns="" xmlns:a14="http://schemas.microsoft.com/office/drawing/2010/main">
                 <a:solidFill>
                   <a:srgbClr val="FFFFFF"/>
                 </a:solidFill>
               </a14:hiddenFill>
             </a:ext>
             <a:ext uri="{91240B29-F687-4f45-9708-019B960494DF}">
-              <a14:hiddenLine xmlns:a14="http://schemas.microsoft.com/office/drawing/2010/main" xmlns="" w="9525">
+              <a14:hiddenLine xmlns="" xmlns:a14="http://schemas.microsoft.com/office/drawing/2010/main" w="9525">
                 <a:solidFill>
                   <a:srgbClr val="000000"/>
                 </a:solidFill>
@@ -10523,14 +10523,14 @@
           </a:ln>
           <a:extLst>
             <a:ext uri="{909E8E84-426E-40dd-AFC4-6F175D3DCCD1}">
-              <a14:hiddenFill xmlns:a14="http://schemas.microsoft.com/office/drawing/2010/main" xmlns="">
+              <a14:hiddenFill xmlns="" xmlns:a14="http://schemas.microsoft.com/office/drawing/2010/main">
                 <a:solidFill>
                   <a:srgbClr val="FFFFFF"/>
                 </a:solidFill>
               </a14:hiddenFill>
             </a:ext>
             <a:ext uri="{91240B29-F687-4f45-9708-019B960494DF}">
-              <a14:hiddenLine xmlns:a14="http://schemas.microsoft.com/office/drawing/2010/main" xmlns="" w="9525">
+              <a14:hiddenLine xmlns="" xmlns:a14="http://schemas.microsoft.com/office/drawing/2010/main" w="9525">
                 <a:solidFill>
                   <a:srgbClr val="000000"/>
                 </a:solidFill>
@@ -10610,7 +10610,7 @@
               <a:defRPr/>
             </a:pPr>
             <a:r>
-              <a:rPr lang="en-US" dirty="0">
+              <a:rPr lang="en-US" dirty="0" smtClean="0">
                 <a:solidFill>
                   <a:srgbClr val="7D868C"/>
                 </a:solidFill>
@@ -10621,7 +10621,7 @@
               <a:t>©</a:t>
             </a:r>
             <a:r>
-              <a:rPr lang="en-US" dirty="0" smtClean="0">
+              <a:rPr lang="is-IS" dirty="0" smtClean="0">
                 <a:solidFill>
                   <a:srgbClr val="7D868C"/>
                 </a:solidFill>
@@ -10629,7 +10629,18 @@
                 <a:ea typeface="+mn-ea"/>
                 <a:cs typeface="+mn-cs"/>
               </a:rPr>
-              <a:t>2016 </a:t>
+              <a:t>2017</a:t>
+            </a:r>
+            <a:r>
+              <a:rPr lang="en-US" dirty="0" smtClean="0">
+                <a:solidFill>
+                  <a:srgbClr val="7D868C"/>
+                </a:solidFill>
+                <a:latin typeface="+mn-lt"/>
+                <a:ea typeface="+mn-ea"/>
+                <a:cs typeface="+mn-cs"/>
+              </a:rPr>
+              <a:t> </a:t>
             </a:r>
             <a:r>
               <a:rPr lang="en-US" dirty="0">
@@ -11304,14 +11315,14 @@
           </a:ln>
           <a:extLst>
             <a:ext uri="{909E8E84-426E-40dd-AFC4-6F175D3DCCD1}">
-              <a14:hiddenFill xmlns:a14="http://schemas.microsoft.com/office/drawing/2010/main" xmlns="">
+              <a14:hiddenFill xmlns="" xmlns:a14="http://schemas.microsoft.com/office/drawing/2010/main">
                 <a:solidFill>
                   <a:srgbClr val="FFFFFF"/>
                 </a:solidFill>
               </a14:hiddenFill>
             </a:ext>
             <a:ext uri="{91240B29-F687-4f45-9708-019B960494DF}">
-              <a14:hiddenLine xmlns:a14="http://schemas.microsoft.com/office/drawing/2010/main" xmlns="" w="9525">
+              <a14:hiddenLine xmlns="" xmlns:a14="http://schemas.microsoft.com/office/drawing/2010/main" w="9525">
                 <a:solidFill>
                   <a:srgbClr val="000000"/>
                 </a:solidFill>
@@ -11391,7 +11402,7 @@
               <a:defRPr/>
             </a:pPr>
             <a:r>
-              <a:rPr lang="en-US" dirty="0">
+              <a:rPr lang="en-US" dirty="0" smtClean="0">
                 <a:solidFill>
                   <a:srgbClr val="7D868C"/>
                 </a:solidFill>
@@ -11402,7 +11413,7 @@
               <a:t>©</a:t>
             </a:r>
             <a:r>
-              <a:rPr lang="en-US" dirty="0" smtClean="0">
+              <a:rPr lang="is-IS" dirty="0" smtClean="0">
                 <a:solidFill>
                   <a:srgbClr val="7D868C"/>
                 </a:solidFill>
@@ -11410,7 +11421,18 @@
                 <a:ea typeface="+mn-ea"/>
                 <a:cs typeface="+mn-cs"/>
               </a:rPr>
-              <a:t>2016 </a:t>
+              <a:t>2017</a:t>
+            </a:r>
+            <a:r>
+              <a:rPr lang="en-US" dirty="0" smtClean="0">
+                <a:solidFill>
+                  <a:srgbClr val="7D868C"/>
+                </a:solidFill>
+                <a:latin typeface="+mn-lt"/>
+                <a:ea typeface="+mn-ea"/>
+                <a:cs typeface="+mn-cs"/>
+              </a:rPr>
+              <a:t> </a:t>
             </a:r>
             <a:r>
               <a:rPr lang="en-US" dirty="0">
@@ -12175,14 +12197,14 @@
           </a:ln>
           <a:extLst>
             <a:ext uri="{909E8E84-426E-40dd-AFC4-6F175D3DCCD1}">
-              <a14:hiddenFill xmlns:a14="http://schemas.microsoft.com/office/drawing/2010/main" xmlns="">
+              <a14:hiddenFill xmlns="" xmlns:a14="http://schemas.microsoft.com/office/drawing/2010/main">
                 <a:solidFill>
                   <a:srgbClr val="FFFFFF"/>
                 </a:solidFill>
               </a14:hiddenFill>
             </a:ext>
             <a:ext uri="{91240B29-F687-4f45-9708-019B960494DF}">
-              <a14:hiddenLine xmlns:a14="http://schemas.microsoft.com/office/drawing/2010/main" xmlns="" w="9525">
+              <a14:hiddenLine xmlns="" xmlns:a14="http://schemas.microsoft.com/office/drawing/2010/main" w="9525">
                 <a:solidFill>
                   <a:srgbClr val="000000"/>
                 </a:solidFill>

</xml_diff>